<commit_message>
updated Readme and session preso
</commit_message>
<xml_diff>
--- a/DevNetCreate-ConfigApprove.pptx
+++ b/DevNetCreate-ConfigApprove.pptx
@@ -21264,9 +21264,10 @@
           <a:bodyPr/>
           <a:lstStyle/>
           <a:p>
+            <a:pPr algn="ctr"/>
             <a:r>
               <a:rPr lang="en-US" dirty="0"/>
-              <a:t>@zapodeanu</a:t>
+              <a:t>@zapodeanu         gzapodea@cisco.com         github.com/gzapodea</a:t>
             </a:r>
           </a:p>
         </p:txBody>
@@ -21352,7 +21353,7 @@
           <a:p>
             <a:r>
               <a:rPr lang="en-US" dirty="0"/>
-              <a:t>Guest Shell Overview</a:t>
+              <a:t>IOS XE Guest Shell Overview</a:t>
             </a:r>
           </a:p>
         </p:txBody>
@@ -21370,12 +21371,12 @@
         <p:spPr>
           <a:xfrm>
             <a:off x="325315" y="1373534"/>
-            <a:ext cx="8519747" cy="3394472"/>
+            <a:ext cx="8519747" cy="3506474"/>
           </a:xfrm>
         </p:spPr>
         <p:txBody>
           <a:bodyPr>
-            <a:normAutofit lnSpcReduction="10000"/>
+            <a:normAutofit fontScale="92500" lnSpcReduction="10000"/>
           </a:bodyPr>
           <a:lstStyle/>
           <a:p>
@@ -21417,7 +21418,7 @@
                   <a:schemeClr val="tx2"/>
                 </a:solidFill>
               </a:rPr>
-              <a:t>Access to  /bootflash and IOS XE CLI</a:t>
+              <a:t>Access to  /bootflash</a:t>
             </a:r>
           </a:p>
           <a:p>
@@ -21428,6 +21429,17 @@
                   <a:schemeClr val="tx2"/>
                 </a:solidFill>
               </a:rPr>
+              <a:t>Device management using CLI, NETCONF and RESTCONF</a:t>
+            </a:r>
+          </a:p>
+          <a:p>
+            <a:pPr lvl="1"/>
+            <a:r>
+              <a:rPr lang="en-US" dirty="0">
+                <a:solidFill>
+                  <a:schemeClr val="tx2"/>
+                </a:solidFill>
+              </a:rPr>
               <a:t>The ability to install and run Linux applications</a:t>
             </a:r>
           </a:p>
@@ -21449,17 +21461,6 @@
               </a:rPr>
               <a:t>on-box Python Scripts</a:t>
             </a:r>
-          </a:p>
-          <a:p>
-            <a:pPr lvl="1"/>
-            <a:endParaRPr lang="en-US" altLang="en-US" dirty="0">
-              <a:solidFill>
-                <a:schemeClr val="tx2"/>
-              </a:solidFill>
-            </a:endParaRPr>
-          </a:p>
-          <a:p>
-            <a:pPr lvl="1"/>
             <a:endParaRPr lang="en-US" altLang="en-US" dirty="0">
               <a:solidFill>
                 <a:schemeClr val="tx2"/>
@@ -21504,88 +21505,6 @@
       </p:transition>
     </mc:Fallback>
   </mc:AlternateContent>
-  <p:timing>
-    <p:tnLst>
-      <p:par>
-        <p:cTn id="1" dur="indefinite" restart="never" nodeType="tmRoot">
-          <p:childTnLst>
-            <p:seq concurrent="1" nextAc="seek">
-              <p:cTn id="2" dur="indefinite" nodeType="mainSeq">
-                <p:childTnLst>
-                  <p:par>
-                    <p:cTn id="3" fill="hold" nodeType="clickPar">
-                      <p:stCondLst>
-                        <p:cond delay="indefinite"/>
-                      </p:stCondLst>
-                      <p:childTnLst>
-                        <p:par>
-                          <p:cTn id="4" fill="hold" nodeType="withGroup">
-                            <p:stCondLst>
-                              <p:cond delay="0"/>
-                            </p:stCondLst>
-                            <p:childTnLst>
-                              <p:par>
-                                <p:cTn id="5" presetID="1" presetClass="entr" presetSubtype="0" fill="hold" grpId="0" nodeType="clickEffect">
-                                  <p:stCondLst>
-                                    <p:cond delay="0"/>
-                                  </p:stCondLst>
-                                  <p:childTnLst>
-                                    <p:set>
-                                      <p:cBhvr>
-                                        <p:cTn id="6" dur="1" fill="hold">
-                                          <p:stCondLst>
-                                            <p:cond delay="0"/>
-                                          </p:stCondLst>
-                                        </p:cTn>
-                                        <p:tgtEl>
-                                          <p:spTgt spid="49155">
-                                            <p:txEl>
-                                              <p:pRg st="0" end="0"/>
-                                            </p:txEl>
-                                          </p:spTgt>
-                                        </p:tgtEl>
-                                        <p:attrNameLst>
-                                          <p:attrName>style.visibility</p:attrName>
-                                        </p:attrNameLst>
-                                      </p:cBhvr>
-                                      <p:to>
-                                        <p:strVal val="visible"/>
-                                      </p:to>
-                                    </p:set>
-                                  </p:childTnLst>
-                                </p:cTn>
-                              </p:par>
-                            </p:childTnLst>
-                          </p:cTn>
-                        </p:par>
-                      </p:childTnLst>
-                    </p:cTn>
-                  </p:par>
-                </p:childTnLst>
-              </p:cTn>
-              <p:prevCondLst>
-                <p:cond evt="onPrev" delay="0">
-                  <p:tgtEl>
-                    <p:sldTgt/>
-                  </p:tgtEl>
-                </p:cond>
-              </p:prevCondLst>
-              <p:nextCondLst>
-                <p:cond evt="onNext" delay="0">
-                  <p:tgtEl>
-                    <p:sldTgt/>
-                  </p:tgtEl>
-                </p:cond>
-              </p:nextCondLst>
-            </p:seq>
-          </p:childTnLst>
-        </p:cTn>
-      </p:par>
-    </p:tnLst>
-    <p:bldLst>
-      <p:bldP spid="49155" grpId="0" build="p"/>
-    </p:bldLst>
-  </p:timing>
 </p:sld>
 </file>
 
@@ -21647,8 +21566,8 @@
         </p:nvSpPr>
         <p:spPr>
           <a:xfrm>
-            <a:off x="214379" y="1141878"/>
-            <a:ext cx="4079631" cy="3724096"/>
+            <a:off x="56884" y="1132253"/>
+            <a:ext cx="4582493" cy="3447098"/>
           </a:xfrm>
           <a:prstGeom prst="rect">
             <a:avLst/>
@@ -21693,7 +21612,7 @@
                   <a:schemeClr val="tx2"/>
                 </a:solidFill>
               </a:rPr>
-              <a:t> to your CSR1000V router</a:t>
+              <a:t> to your CSR1000V router (10.10.20.48)</a:t>
             </a:r>
           </a:p>
           <a:p>
@@ -21822,8 +21741,8 @@
         </p:blipFill>
         <p:spPr>
           <a:xfrm>
-            <a:off x="4443381" y="612949"/>
-            <a:ext cx="4595658" cy="4062106"/>
+            <a:off x="4639377" y="786189"/>
+            <a:ext cx="4399662" cy="3888865"/>
           </a:xfrm>
           <a:prstGeom prst="rect">
             <a:avLst/>
@@ -23860,7 +23779,13 @@
               <a:rPr lang="en-US" sz="1000" dirty="0">
                 <a:latin typeface="Courier" pitchFamily="2" charset="0"/>
               </a:rPr>
-              <a:t>[guestshell@guestshell ~]$ cat /etc/resolv.conf</a:t>
+              <a:t>[guestshell@guestshell ~]$ </a:t>
+            </a:r>
+            <a:r>
+              <a:rPr lang="en-US" sz="1000" b="1" dirty="0">
+                <a:latin typeface="Courier" pitchFamily="2" charset="0"/>
+              </a:rPr>
+              <a:t>cat /etc/resolv.conf</a:t>
             </a:r>
           </a:p>
           <a:p>
@@ -25109,7 +25034,7 @@
               <a:rPr lang="en-US" sz="1200" dirty="0">
                 <a:latin typeface="Courier" pitchFamily="2" charset="0"/>
               </a:rPr>
-              <a:t>ipaddress (1.0.19)</a:t>
+              <a:t>cryptography (2.2.2)</a:t>
             </a:r>
           </a:p>
           <a:p>
@@ -25282,11 +25207,7 @@
           <a:p>
             <a:r>
               <a:rPr lang="en-US" sz="1400" b="1" dirty="0"/>
-              <a:t>git --version - </a:t>
-            </a:r>
-            <a:r>
-              <a:rPr lang="en-US" sz="1400" dirty="0"/>
-              <a:t>git version 1.8.3.1</a:t>
+              <a:t>git --version - git version 1.8.3.1</a:t>
             </a:r>
           </a:p>
           <a:p>
@@ -25302,44 +25223,39 @@
           <a:p>
             <a:pPr lvl="1"/>
             <a:r>
-              <a:rPr lang="en-US" sz="1400" dirty="0"/>
-              <a:t>git config --global user.name "Your Name "</a:t>
+              <a:rPr lang="en-US" sz="1400" b="1" dirty="0"/>
+              <a:t>git config --global user.name "Your GitHub Username "</a:t>
             </a:r>
           </a:p>
           <a:p>
             <a:pPr lvl="1"/>
             <a:r>
-              <a:rPr lang="en-US" sz="1400" dirty="0"/>
+              <a:rPr lang="en-US" sz="1400" b="1" dirty="0"/>
               <a:t>git config --global user.email "</a:t>
             </a:r>
             <a:r>
-              <a:rPr lang="en-US" sz="1400" dirty="0">
+              <a:rPr lang="en-US" sz="1400" b="1" dirty="0">
                 <a:hlinkClick r:id="rId3"/>
               </a:rPr>
               <a:t>you@example.com</a:t>
             </a:r>
             <a:r>
-              <a:rPr lang="en-US" sz="1400" dirty="0"/>
-              <a:t> "</a:t>
+              <a:rPr lang="en-US" sz="1400" b="1" dirty="0"/>
+              <a:t>"</a:t>
             </a:r>
           </a:p>
           <a:p>
             <a:pPr lvl="1"/>
             <a:r>
-              <a:rPr lang="en-US" sz="1400" dirty="0"/>
-              <a:t>git config --global credential.helper 'cache --timeout 3600'</a:t>
-            </a:r>
-          </a:p>
-          <a:p>
-            <a:r>
               <a:rPr lang="en-US" sz="1400" b="1" dirty="0"/>
-              <a:t>Verify Git Config - </a:t>
-            </a:r>
-            <a:r>
-              <a:rPr lang="en-US" sz="1400" dirty="0"/>
-              <a:t>git config --list</a:t>
-            </a:r>
-            <a:endParaRPr lang="en-US" sz="1400" b="1" dirty="0"/>
+              <a:t>git config --global credential.helper "cache --timeout 3600"</a:t>
+            </a:r>
+          </a:p>
+          <a:p>
+            <a:r>
+              <a:rPr lang="en-US" sz="1400" b="1" dirty="0"/>
+              <a:t>Verify Git Config - git config --list</a:t>
+            </a:r>
           </a:p>
           <a:p>
             <a:r>
@@ -25350,14 +25266,14 @@
           <a:p>
             <a:pPr lvl="1"/>
             <a:r>
-              <a:rPr lang="en-US" sz="1400" dirty="0"/>
+              <a:rPr lang="en-US" sz="1400" b="1" dirty="0"/>
               <a:t>sudo yum install curl-devel</a:t>
             </a:r>
           </a:p>
           <a:p>
             <a:pPr lvl="1"/>
             <a:r>
-              <a:rPr lang="en-US" sz="1400" dirty="0"/>
+              <a:rPr lang="en-US" sz="1400" b="1" dirty="0"/>
               <a:t>sudo yum update -y nss curl libcurl</a:t>
             </a:r>
           </a:p>
@@ -25925,7 +25841,12 @@
             <p:ph type="body" sz="half" idx="14"/>
           </p:nvPr>
         </p:nvSpPr>
-        <p:spPr/>
+        <p:spPr>
+          <a:xfrm>
+            <a:off x="3731126" y="2316791"/>
+            <a:ext cx="4666916" cy="2361087"/>
+          </a:xfrm>
+        </p:spPr>
         <p:txBody>
           <a:bodyPr>
             <a:normAutofit fontScale="92500" lnSpcReduction="20000"/>
@@ -25934,8 +25855,11 @@
           <a:p>
             <a:r>
               <a:rPr lang="en-US" dirty="0"/>
-              <a:t>Gabriel Zapodeanu is a Network Programmability Technology Solutions Architect. He is presently part of the Architecture and Engineering team, Cisco Global Partner Organization. </a:t>
-            </a:r>
+              <a:t>Gabriel Zapodeanu is a Network Programmability Technology Solutions Architect. He is presently part of the Architecture and Engineering team, Cisco Global Partner Organization.</a:t>
+            </a:r>
+          </a:p>
+          <a:p>
+            <a:endParaRPr lang="en-US" dirty="0"/>
           </a:p>
           <a:p>
             <a:r>
@@ -26108,7 +26032,7 @@
                   <a:schemeClr val="tx2"/>
                 </a:solidFill>
               </a:rPr>
-              <a:t>File operations Guest Shell:</a:t>
+              <a:t>File operations Guest Shell (sometimes sudo is required)</a:t>
             </a:r>
           </a:p>
           <a:p>
@@ -26162,7 +26086,7 @@
                 </a:solidFill>
                 <a:latin typeface="Courier" pitchFamily="2" charset="0"/>
               </a:rPr>
-              <a:t>Cat /bootflash/path/to/file (display the content of file)</a:t>
+              <a:t>cat /bootflash/path/to/file (display the content of file)</a:t>
             </a:r>
           </a:p>
           <a:p>
@@ -32598,7 +32522,12 @@
             <p:ph type="title"/>
           </p:nvPr>
         </p:nvSpPr>
-        <p:spPr/>
+        <p:spPr>
+          <a:xfrm>
+            <a:off x="437949" y="80851"/>
+            <a:ext cx="8229600" cy="857250"/>
+          </a:xfrm>
+        </p:spPr>
         <p:txBody>
           <a:bodyPr/>
           <a:lstStyle/>
@@ -32626,8 +32555,8 @@
         </p:nvSpPr>
         <p:spPr>
           <a:xfrm>
-            <a:off x="223521" y="1188141"/>
-            <a:ext cx="4500880" cy="2774259"/>
+            <a:off x="88767" y="938101"/>
+            <a:ext cx="4752739" cy="3143011"/>
           </a:xfrm>
           <a:prstGeom prst="rect">
             <a:avLst/>
@@ -32854,7 +32783,7 @@
                 </a:solidFill>
                 <a:latin typeface="Courier" pitchFamily="2" charset="0"/>
               </a:rPr>
-              <a:t>  Hardware is CSR vNIC, address is 0050.56ac.232f (bia 0050.56ac.232f)</a:t>
+              <a:t>   Hardware is CSR vNIC, address is 0050.56ac.22c3 (bia 0050.56ac.22c3)</a:t>
             </a:r>
           </a:p>
           <a:p>
@@ -32887,7 +32816,7 @@
                 </a:solidFill>
                 <a:latin typeface="Courier" pitchFamily="2" charset="0"/>
               </a:rPr>
-              <a:t>  MTU 1500 bytes, BW 1000000 Kbit/sec, DLY 10 usec,</a:t>
+              <a:t>  Full Duplex, 1000Mbps, link type is auto, media type RJ45</a:t>
             </a:r>
           </a:p>
           <a:p>
@@ -32898,7 +32827,7 @@
                 </a:solidFill>
                 <a:latin typeface="Courier" pitchFamily="2" charset="0"/>
               </a:rPr>
-              <a:t>      reliability 255/255, txload 1/255, rxload 1/255  Encapsulation ARPA, loopback not set</a:t>
+              <a:t>  Last clearing of "show interface" counters never</a:t>
             </a:r>
           </a:p>
           <a:p>
@@ -32909,7 +32838,7 @@
                 </a:solidFill>
                 <a:latin typeface="Courier" pitchFamily="2" charset="0"/>
               </a:rPr>
-              <a:t>…</a:t>
+              <a:t>  5 minute input rate 100000 bits/sec, 3 packets/sec</a:t>
             </a:r>
           </a:p>
           <a:p>
@@ -32920,16 +32849,52 @@
                 </a:solidFill>
                 <a:latin typeface="Courier" pitchFamily="2" charset="0"/>
               </a:rPr>
+              <a:t>  5 minute output rate 1000 bits/sec, 2 packets/sec</a:t>
+            </a:r>
+          </a:p>
+          <a:p>
+            <a:r>
+              <a:rPr lang="en-US" sz="1000" dirty="0">
+                <a:solidFill>
+                  <a:srgbClr val="000000"/>
+                </a:solidFill>
+                <a:latin typeface="Courier" pitchFamily="2" charset="0"/>
+              </a:rPr>
+              <a:t>     40897 packets input, 49324086 bytes, 0 no buffer</a:t>
+            </a:r>
+          </a:p>
+          <a:p>
+            <a:r>
+              <a:rPr lang="en-US" sz="1000" dirty="0">
+                <a:solidFill>
+                  <a:srgbClr val="000000"/>
+                </a:solidFill>
+                <a:latin typeface="Courier" pitchFamily="2" charset="0"/>
+              </a:rPr>
+              <a:t>     Received 0 broadcasts (0 IP multicasts)</a:t>
+            </a:r>
+          </a:p>
+          <a:p>
+            <a:r>
+              <a:rPr lang="en-US" sz="1000" dirty="0">
+                <a:solidFill>
+                  <a:srgbClr val="000000"/>
+                </a:solidFill>
+                <a:latin typeface="Courier" pitchFamily="2" charset="0"/>
+              </a:rPr>
+              <a:t>     21486 packets output, 1658940 bytes, 0 underruns</a:t>
+            </a:r>
+          </a:p>
+          <a:p>
+            <a:r>
+              <a:rPr lang="en-US" sz="1000" dirty="0">
+                <a:solidFill>
+                  <a:srgbClr val="000000"/>
+                </a:solidFill>
+                <a:latin typeface="Courier" pitchFamily="2" charset="0"/>
+              </a:rPr>
               <a:t>&gt;&gt;&gt;</a:t>
             </a:r>
-          </a:p>
-          <a:p>
-            <a:endParaRPr lang="en-US" sz="1000" dirty="0">
-              <a:solidFill>
-                <a:srgbClr val="000000"/>
-              </a:solidFill>
-              <a:latin typeface="Courier" pitchFamily="2" charset="0"/>
-            </a:endParaRPr>
           </a:p>
           <a:p>
             <a:pPr algn="ctr"/>
@@ -32961,8 +32926,8 @@
         </p:nvSpPr>
         <p:spPr>
           <a:xfrm>
-            <a:off x="4287521" y="1272902"/>
-            <a:ext cx="4683759" cy="3685177"/>
+            <a:off x="4312491" y="1289237"/>
+            <a:ext cx="4683759" cy="3667558"/>
           </a:xfrm>
           <a:prstGeom prst="rect">
             <a:avLst/>
@@ -33326,7 +33291,7 @@
         </p:nvSpPr>
         <p:spPr>
           <a:xfrm>
-            <a:off x="690880" y="4206240"/>
+            <a:off x="1436657" y="4338057"/>
             <a:ext cx="2630848" cy="338554"/>
           </a:xfrm>
           <a:prstGeom prst="rect">
@@ -33602,7 +33567,7 @@
         </p:nvSpPr>
         <p:spPr>
           <a:xfrm>
-            <a:off x="457200" y="1373534"/>
+            <a:off x="457200" y="1128056"/>
             <a:ext cx="8229600" cy="821026"/>
           </a:xfrm>
         </p:spPr>
@@ -33626,41 +33591,49 @@
           </a:p>
         </p:txBody>
       </p:sp>
-      <p:sp>
-        <p:nvSpPr>
-          <p:cNvPr id="8" name="TextBox 7">
+      <p:pic>
+        <p:nvPicPr>
+          <p:cNvPr id="9" name="Picture 8">
             <a:extLst>
               <a:ext uri="{FF2B5EF4-FFF2-40B4-BE49-F238E27FC236}">
-                <a16:creationId xmlns:a16="http://schemas.microsoft.com/office/drawing/2014/main" id="{CF6FC670-0B71-FB4C-8625-54E094C603DE}"/>
+                <a16:creationId xmlns:a16="http://schemas.microsoft.com/office/drawing/2014/main" id="{AAF2985B-7976-6F49-9761-1645352EF44D}"/>
               </a:ext>
             </a:extLst>
           </p:cNvPr>
-          <p:cNvSpPr txBox="1"/>
+          <p:cNvPicPr>
+            <a:picLocks noChangeAspect="1"/>
+          </p:cNvPicPr>
           <p:nvPr/>
-        </p:nvSpPr>
+        </p:nvPicPr>
+        <p:blipFill>
+          <a:blip r:embed="rId3"/>
+          <a:stretch>
+            <a:fillRect/>
+          </a:stretch>
+        </p:blipFill>
         <p:spPr>
           <a:xfrm>
-            <a:off x="2623930" y="3069203"/>
-            <a:ext cx="3219920" cy="369332"/>
+            <a:off x="1684421" y="1715525"/>
+            <a:ext cx="5768045" cy="3183734"/>
           </a:xfrm>
           <a:prstGeom prst="rect">
             <a:avLst/>
           </a:prstGeom>
           <a:noFill/>
+          <a:ln>
+            <a:solidFill>
+              <a:schemeClr val="accent1"/>
+            </a:solidFill>
+          </a:ln>
+          <a:effectLst>
+            <a:outerShdw blurRad="50800" dist="38100" dir="2700000" algn="tl" rotWithShape="0">
+              <a:prstClr val="black">
+                <a:alpha val="40000"/>
+              </a:prstClr>
+            </a:outerShdw>
+          </a:effectLst>
         </p:spPr>
-        <p:txBody>
-          <a:bodyPr wrap="none" rtlCol="0">
-            <a:spAutoFit/>
-          </a:bodyPr>
-          <a:lstStyle/>
-          <a:p>
-            <a:r>
-              <a:rPr lang="en-US" dirty="0"/>
-              <a:t>Enter Screenshot of github repo</a:t>
-            </a:r>
-          </a:p>
-        </p:txBody>
-      </p:sp>
+      </p:pic>
     </p:spTree>
     <p:extLst>
       <p:ext uri="{BB962C8B-B14F-4D97-AF65-F5344CB8AC3E}">
@@ -33909,8 +33882,8 @@
         </p:nvSpPr>
         <p:spPr>
           <a:xfrm>
-            <a:off x="95794" y="1656052"/>
-            <a:ext cx="8952412" cy="3307834"/>
+            <a:off x="95794" y="1516513"/>
+            <a:ext cx="8952412" cy="3440497"/>
           </a:xfrm>
           <a:prstGeom prst="rect">
             <a:avLst/>
@@ -34260,7 +34233,7 @@
               <a:rPr lang="en-US" sz="1000" dirty="0">
                 <a:latin typeface="Courier" pitchFamily="2" charset="0"/>
               </a:rPr>
-              <a:t> event syslog pattern "SYS-5-CONFIG_I" action 0 cli command "enable" action 1 cli command "guestshell run </a:t>
+              <a:t> event syslog pattern "SYS-5-CONFIG_I”</a:t>
             </a:r>
           </a:p>
           <a:p>
@@ -34268,7 +34241,15 @@
               <a:rPr lang="en-US" sz="1000" dirty="0">
                 <a:latin typeface="Courier" pitchFamily="2" charset="0"/>
               </a:rPr>
-              <a:t>                   python /bootflash/DevNet_Create_2018/config_change.py"</a:t>
+              <a:t> action 0 cli command "enable”</a:t>
+            </a:r>
+          </a:p>
+          <a:p>
+            <a:r>
+              <a:rPr lang="en-US" sz="1000" dirty="0">
+                <a:latin typeface="Courier" pitchFamily="2" charset="0"/>
+              </a:rPr>
+              <a:t> action 1 cli command "guestshell run python /bootflash/DevNet_Create_2018/config_change.py” ….</a:t>
             </a:r>
           </a:p>
         </p:txBody>
@@ -34287,7 +34268,7 @@
         </p:nvSpPr>
         <p:spPr>
           <a:xfrm>
-            <a:off x="5256622" y="2855479"/>
+            <a:off x="4929363" y="2701475"/>
             <a:ext cx="1698350" cy="369332"/>
           </a:xfrm>
           <a:prstGeom prst="rect">
@@ -34332,7 +34313,7 @@
         </p:nvSpPr>
         <p:spPr>
           <a:xfrm>
-            <a:off x="406696" y="1194387"/>
+            <a:off x="361609" y="1116404"/>
             <a:ext cx="8420782" cy="400110"/>
           </a:xfrm>
           <a:prstGeom prst="rect">
@@ -34822,7 +34803,7 @@
               <a:rPr lang="en-US" sz="1400" b="1" dirty="0">
                 <a:latin typeface="Courier" pitchFamily="2" charset="0"/>
               </a:rPr>
-              <a:t>cd /bootflash/cd /bootflash</a:t>
+              <a:t>cd /bootflash/</a:t>
             </a:r>
           </a:p>
           <a:p>
@@ -34839,13 +34820,7 @@
               <a:rPr lang="en-US" sz="1400" b="1" dirty="0">
                 <a:latin typeface="Courier" pitchFamily="2" charset="0"/>
               </a:rPr>
-              <a:t>mkdir </a:t>
-            </a:r>
-            <a:r>
-              <a:rPr lang="en-US" sz="1400" dirty="0">
-                <a:latin typeface="Courier" pitchFamily="2" charset="0"/>
-              </a:rPr>
-              <a:t>CONFIG_FILES</a:t>
+              <a:t>mkdir CONFIG_FILES</a:t>
             </a:r>
           </a:p>
           <a:p>
@@ -34856,7 +34831,13 @@
               <a:rPr lang="en-US" sz="1400" dirty="0">
                 <a:latin typeface="Courier" pitchFamily="2" charset="0"/>
               </a:rPr>
-              <a:t>[guestshell@guestshell bootflash]$ ls</a:t>
+              <a:t>[guestshell@guestshell bootflash]$ </a:t>
+            </a:r>
+            <a:r>
+              <a:rPr lang="en-US" sz="1400" b="1" dirty="0">
+                <a:latin typeface="Courier" pitchFamily="2" charset="0"/>
+              </a:rPr>
+              <a:t>ls</a:t>
             </a:r>
           </a:p>
           <a:p>
@@ -34872,12 +34853,6 @@
               </a:rPr>
               <a:t>CONFIG_FILES                </a:t>
             </a:r>
-            <a:r>
-              <a:rPr lang="en-US" sz="1400" dirty="0">
-                <a:latin typeface="Courier" pitchFamily="2" charset="0"/>
-              </a:rPr>
-              <a:t>ovf-env.xml.md5</a:t>
-            </a:r>
           </a:p>
           <a:p>
             <a:pPr marL="0" indent="0">
@@ -34898,6 +34873,20 @@
               <a:buNone/>
             </a:pPr>
             <a:r>
+              <a:rPr lang="en-US" sz="1400" b="1" dirty="0">
+                <a:solidFill>
+                  <a:schemeClr val="accent1"/>
+                </a:solidFill>
+                <a:latin typeface="Courier" pitchFamily="2" charset="0"/>
+              </a:rPr>
+              <a:t>…</a:t>
+            </a:r>
+          </a:p>
+          <a:p>
+            <a:pPr marL="0" indent="0">
+              <a:buNone/>
+            </a:pPr>
+            <a:r>
               <a:rPr lang="en-US" sz="1400" dirty="0">
                 <a:latin typeface="Courier" pitchFamily="2" charset="0"/>
               </a:rPr>
@@ -34918,7 +34907,10 @@
               <a:buNone/>
             </a:pPr>
             <a:r>
-              <a:rPr lang="en-US" sz="1400" dirty="0">
+              <a:rPr lang="en-US" sz="1600" b="1" dirty="0">
+                <a:solidFill>
+                  <a:schemeClr val="accent1"/>
+                </a:solidFill>
                 <a:latin typeface="Courier" pitchFamily="2" charset="0"/>
               </a:rPr>
               <a:t>Read and execute the initialize script:</a:t>
@@ -35524,23 +35516,33 @@
         </p:nvSpPr>
         <p:spPr>
           <a:xfrm>
-            <a:off x="386861" y="1055582"/>
-            <a:ext cx="8229599" cy="1027964"/>
+            <a:off x="386861" y="1065207"/>
+            <a:ext cx="8229599" cy="732092"/>
           </a:xfrm>
         </p:spPr>
         <p:txBody>
           <a:bodyPr>
-            <a:normAutofit/>
+            <a:normAutofit lnSpcReduction="10000"/>
           </a:bodyPr>
           <a:lstStyle/>
           <a:p>
             <a:r>
-              <a:rPr lang="en-US" dirty="0">
+              <a:rPr lang="en-US" sz="2000" b="1" dirty="0">
                 <a:solidFill>
                   <a:schemeClr val="tx2"/>
                 </a:solidFill>
               </a:rPr>
               <a:t>edit the config.py file located /bootflash/DevNet…</a:t>
+            </a:r>
+          </a:p>
+          <a:p>
+            <a:r>
+              <a:rPr lang="en-US" sz="2000" b="1" dirty="0">
+                <a:solidFill>
+                  <a:schemeClr val="tx2"/>
+                </a:solidFill>
+              </a:rPr>
+              <a:t>sudo vi config.py</a:t>
             </a:r>
           </a:p>
         </p:txBody>
@@ -35748,7 +35750,13 @@
               <a:rPr lang="en-US" sz="1200" dirty="0">
                 <a:latin typeface="Courier" pitchFamily="2" charset="0"/>
               </a:rPr>
-              <a:t>[guestshell@guestshell]$ cd /bootflash</a:t>
+              <a:t>[guestshell@guestshell]$ </a:t>
+            </a:r>
+            <a:r>
+              <a:rPr lang="en-US" sz="1200" b="1" dirty="0">
+                <a:latin typeface="Courier" pitchFamily="2" charset="0"/>
+              </a:rPr>
+              <a:t>cd /bootflash</a:t>
             </a:r>
           </a:p>
           <a:p>
@@ -35759,7 +35767,13 @@
               <a:rPr lang="en-US" sz="1200" dirty="0">
                 <a:latin typeface="Courier" pitchFamily="2" charset="0"/>
               </a:rPr>
-              <a:t>[guestshell@guestshell bootflash]$ ls</a:t>
+              <a:t>[guestshell@guestshell bootflash]$ </a:t>
+            </a:r>
+            <a:r>
+              <a:rPr lang="en-US" sz="1200" b="1" dirty="0">
+                <a:latin typeface="Courier" pitchFamily="2" charset="0"/>
+              </a:rPr>
+              <a:t>ls</a:t>
             </a:r>
           </a:p>
           <a:p>
@@ -35798,7 +35812,13 @@
               <a:rPr lang="en-US" sz="1200" dirty="0">
                 <a:latin typeface="Courier" pitchFamily="2" charset="0"/>
               </a:rPr>
-              <a:t>[guestshell@guestshell bootflash]$ ls CONFIG_FILES/</a:t>
+              <a:t>[guestshell@guestshell bootflash]$ </a:t>
+            </a:r>
+            <a:r>
+              <a:rPr lang="en-US" sz="1200" b="1" dirty="0">
+                <a:latin typeface="Courier" pitchFamily="2" charset="0"/>
+              </a:rPr>
+              <a:t>ls CONFIG_FILES/</a:t>
             </a:r>
           </a:p>
           <a:p>
@@ -35820,7 +35840,13 @@
               <a:rPr lang="en-US" sz="1200" dirty="0">
                 <a:latin typeface="Courier" pitchFamily="2" charset="0"/>
               </a:rPr>
-              <a:t>[guestshell@guestshell bootflash]$ cat DevNet_Create_2018/config.py</a:t>
+              <a:t>[guestshell@guestshell bootflash]$ </a:t>
+            </a:r>
+            <a:r>
+              <a:rPr lang="en-US" sz="1200" b="1" dirty="0">
+                <a:latin typeface="Courier" pitchFamily="2" charset="0"/>
+              </a:rPr>
+              <a:t>cat DevNet_Create_2018/config.py</a:t>
             </a:r>
           </a:p>
           <a:p>
@@ -35864,7 +35890,19 @@
               <a:rPr lang="en-US" sz="1200" dirty="0">
                 <a:latin typeface="Courier" pitchFamily="2" charset="0"/>
               </a:rPr>
-              <a:t>SPARK_AUTH = 'Bearer ' + 'NzRiZGU0M2UtOWJjNy00MzQwLWE4MjUtO…’</a:t>
+              <a:t>SPARK_AUTH = 'Bearer ' + </a:t>
+            </a:r>
+            <a:r>
+              <a:rPr lang="en-US" sz="1200" b="1" dirty="0">
+                <a:latin typeface="Courier" pitchFamily="2" charset="0"/>
+              </a:rPr>
+              <a:t>'NzRiZGU0M2UtOWJjNy00MzQwLWE4MjUtO…</a:t>
+            </a:r>
+            <a:r>
+              <a:rPr lang="en-US" sz="1200" dirty="0">
+                <a:latin typeface="Courier" pitchFamily="2" charset="0"/>
+              </a:rPr>
+              <a:t>’</a:t>
             </a:r>
           </a:p>
           <a:p>
@@ -35875,7 +35913,19 @@
               <a:rPr lang="en-US" sz="1200" dirty="0">
                 <a:latin typeface="Courier" pitchFamily="2" charset="0"/>
               </a:rPr>
-              <a:t>SPARK_ROOM = 'Config Change Alert' + 'GabiZ’</a:t>
+              <a:t>SPARK_ROOM = 'Config Change Alert' + '</a:t>
+            </a:r>
+            <a:r>
+              <a:rPr lang="en-US" sz="1200" b="1" dirty="0">
+                <a:latin typeface="Courier" pitchFamily="2" charset="0"/>
+              </a:rPr>
+              <a:t>GabiZ</a:t>
+            </a:r>
+            <a:r>
+              <a:rPr lang="en-US" sz="1200" dirty="0">
+                <a:latin typeface="Courier" pitchFamily="2" charset="0"/>
+              </a:rPr>
+              <a:t>’</a:t>
             </a:r>
           </a:p>
           <a:p>
@@ -35898,6 +35948,17 @@
                 <a:latin typeface="Courier" pitchFamily="2" charset="0"/>
               </a:rPr>
               <a:t>…</a:t>
+            </a:r>
+          </a:p>
+          <a:p>
+            <a:pPr marL="0" indent="0">
+              <a:buNone/>
+            </a:pPr>
+            <a:r>
+              <a:rPr lang="en-US" sz="1200" b="1" dirty="0">
+                <a:latin typeface="Courier" pitchFamily="2" charset="0"/>
+              </a:rPr>
+              <a:t>exit</a:t>
             </a:r>
           </a:p>
         </p:txBody>
@@ -36069,7 +36130,7 @@
               <a:rPr lang="en-US" sz="1400" b="1" dirty="0">
                 <a:latin typeface="Courier" pitchFamily="2" charset="0"/>
               </a:rPr>
-              <a:t>interface l2018</a:t>
+              <a:t>interface loopback2018</a:t>
             </a:r>
           </a:p>
           <a:p>
@@ -36334,9 +36395,16 @@
             <p:ph type="title"/>
           </p:nvPr>
         </p:nvSpPr>
-        <p:spPr/>
+        <p:spPr>
+          <a:xfrm>
+            <a:off x="457200" y="86628"/>
+            <a:ext cx="8229600" cy="731520"/>
+          </a:xfrm>
+        </p:spPr>
         <p:txBody>
-          <a:bodyPr/>
+          <a:bodyPr>
+            <a:normAutofit/>
+          </a:bodyPr>
           <a:lstStyle/>
           <a:p>
             <a:r>
@@ -36348,10 +36416,10 @@
       </p:sp>
       <p:pic>
         <p:nvPicPr>
-          <p:cNvPr id="5" name="Picture 4">
+          <p:cNvPr id="3" name="Picture 2">
             <a:extLst>
               <a:ext uri="{FF2B5EF4-FFF2-40B4-BE49-F238E27FC236}">
-                <a16:creationId xmlns:a16="http://schemas.microsoft.com/office/drawing/2014/main" id="{A8C255D1-41F1-2C47-B506-4EFB4BE07F64}"/>
+                <a16:creationId xmlns:a16="http://schemas.microsoft.com/office/drawing/2014/main" id="{1D1D1626-DC9B-5A45-8597-06272711BCCB}"/>
               </a:ext>
             </a:extLst>
           </p:cNvPr>
@@ -36368,18 +36436,15 @@
         </p:blipFill>
         <p:spPr>
           <a:xfrm>
-            <a:off x="1737360" y="1181981"/>
-            <a:ext cx="5669280" cy="3787034"/>
+            <a:off x="1641525" y="895149"/>
+            <a:ext cx="5860950" cy="4055845"/>
           </a:xfrm>
           <a:prstGeom prst="rect">
             <a:avLst/>
           </a:prstGeom>
           <a:ln>
             <a:solidFill>
-              <a:schemeClr val="accent1">
-                <a:shade val="95000"/>
-                <a:satMod val="105000"/>
-              </a:schemeClr>
+              <a:schemeClr val="accent1"/>
             </a:solidFill>
           </a:ln>
           <a:effectLst>
@@ -37539,8 +37604,8 @@
         </p:nvSpPr>
         <p:spPr>
           <a:xfrm>
-            <a:off x="457200" y="1661822"/>
-            <a:ext cx="8229600" cy="3106183"/>
+            <a:off x="457200" y="1547446"/>
+            <a:ext cx="8446168" cy="3313312"/>
           </a:xfrm>
         </p:spPr>
         <p:txBody>
@@ -37646,61 +37711,7 @@
                 </a:solidFill>
                 <a:cs typeface="Arial" charset="0"/>
               </a:rPr>
-              <a:t>PIP - Tool for installing and managing Python packages (</a:t>
-            </a:r>
-            <a:r>
-              <a:rPr lang="en-US" altLang="en-US" sz="1600" b="1" dirty="0">
-                <a:solidFill>
-                  <a:schemeClr val="tx2"/>
-                </a:solidFill>
-                <a:cs typeface="Arial" charset="0"/>
-              </a:rPr>
-              <a:t>P</a:t>
-            </a:r>
-            <a:r>
-              <a:rPr lang="en-US" altLang="en-US" sz="1600" dirty="0">
-                <a:solidFill>
-                  <a:schemeClr val="tx2"/>
-                </a:solidFill>
-                <a:cs typeface="Arial" charset="0"/>
-              </a:rPr>
-              <a:t>ip </a:t>
-            </a:r>
-            <a:r>
-              <a:rPr lang="en-US" altLang="en-US" sz="1600" b="1" dirty="0">
-                <a:solidFill>
-                  <a:schemeClr val="tx2"/>
-                </a:solidFill>
-                <a:cs typeface="Arial" charset="0"/>
-              </a:rPr>
-              <a:t>I</a:t>
-            </a:r>
-            <a:r>
-              <a:rPr lang="en-US" altLang="en-US" sz="1600" dirty="0">
-                <a:solidFill>
-                  <a:schemeClr val="tx2"/>
-                </a:solidFill>
-                <a:cs typeface="Arial" charset="0"/>
-              </a:rPr>
-              <a:t>nstalls </a:t>
-            </a:r>
-            <a:r>
-              <a:rPr lang="en-US" altLang="en-US" sz="1600" b="1" dirty="0">
-                <a:solidFill>
-                  <a:schemeClr val="tx2"/>
-                </a:solidFill>
-                <a:cs typeface="Arial" charset="0"/>
-              </a:rPr>
-              <a:t>P</a:t>
-            </a:r>
-            <a:r>
-              <a:rPr lang="en-US" altLang="en-US" sz="1600" dirty="0">
-                <a:solidFill>
-                  <a:schemeClr val="tx2"/>
-                </a:solidFill>
-                <a:cs typeface="Arial" charset="0"/>
-              </a:rPr>
-              <a:t>ackages)</a:t>
+              <a:t>sudo - Super User Do</a:t>
             </a:r>
           </a:p>
           <a:p>
@@ -37723,7 +37734,61 @@
                 </a:solidFill>
                 <a:cs typeface="Arial" charset="0"/>
               </a:rPr>
-              <a:t>YUM - (Yellowdog Updater Modified) open source package management tool</a:t>
+              <a:t>PIP - Tool for installing and managing Python packages (</a:t>
+            </a:r>
+            <a:r>
+              <a:rPr lang="en-US" altLang="en-US" sz="1600" b="1" dirty="0">
+                <a:solidFill>
+                  <a:schemeClr val="tx2"/>
+                </a:solidFill>
+                <a:cs typeface="Arial" charset="0"/>
+              </a:rPr>
+              <a:t>P</a:t>
+            </a:r>
+            <a:r>
+              <a:rPr lang="en-US" altLang="en-US" sz="1600" dirty="0">
+                <a:solidFill>
+                  <a:schemeClr val="tx2"/>
+                </a:solidFill>
+                <a:cs typeface="Arial" charset="0"/>
+              </a:rPr>
+              <a:t>ip </a:t>
+            </a:r>
+            <a:r>
+              <a:rPr lang="en-US" altLang="en-US" sz="1600" b="1" dirty="0">
+                <a:solidFill>
+                  <a:schemeClr val="tx2"/>
+                </a:solidFill>
+                <a:cs typeface="Arial" charset="0"/>
+              </a:rPr>
+              <a:t>I</a:t>
+            </a:r>
+            <a:r>
+              <a:rPr lang="en-US" altLang="en-US" sz="1600" dirty="0">
+                <a:solidFill>
+                  <a:schemeClr val="tx2"/>
+                </a:solidFill>
+                <a:cs typeface="Arial" charset="0"/>
+              </a:rPr>
+              <a:t>nstalls </a:t>
+            </a:r>
+            <a:r>
+              <a:rPr lang="en-US" altLang="en-US" sz="1600" b="1" dirty="0">
+                <a:solidFill>
+                  <a:schemeClr val="tx2"/>
+                </a:solidFill>
+                <a:cs typeface="Arial" charset="0"/>
+              </a:rPr>
+              <a:t>P</a:t>
+            </a:r>
+            <a:r>
+              <a:rPr lang="en-US" altLang="en-US" sz="1600" dirty="0">
+                <a:solidFill>
+                  <a:schemeClr val="tx2"/>
+                </a:solidFill>
+                <a:cs typeface="Arial" charset="0"/>
+              </a:rPr>
+              <a:t>ackages)</a:t>
             </a:r>
           </a:p>
           <a:p>
@@ -37746,7 +37811,7 @@
                 </a:solidFill>
                 <a:cs typeface="Arial" charset="0"/>
               </a:rPr>
-              <a:t>CentOS - Linux distribution derived from RHEL</a:t>
+              <a:t>YUM - (Yellowdog Updater Modified) open source package management tool</a:t>
             </a:r>
           </a:p>
           <a:p>
@@ -37769,7 +37834,7 @@
                 </a:solidFill>
                 <a:cs typeface="Arial" charset="0"/>
               </a:rPr>
-              <a:t>Bash - Bourne Again Shell, the Linux standard shell</a:t>
+              <a:t>CentOS - Linux distribution derived from RHEL</a:t>
             </a:r>
           </a:p>
           <a:p>
@@ -37792,7 +37857,7 @@
                 </a:solidFill>
                 <a:cs typeface="Arial" charset="0"/>
               </a:rPr>
-              <a:t>PNP - Plug and Play</a:t>
+              <a:t>Bash - Bourne Again Shell, the Linux standard shell</a:t>
             </a:r>
           </a:p>
           <a:p>
@@ -37815,7 +37880,7 @@
                 </a:solidFill>
                 <a:cs typeface="Arial" charset="0"/>
               </a:rPr>
-              <a:t>CAF - Cisco Application Hosting Framework</a:t>
+              <a:t>PNP - Plug and Play</a:t>
             </a:r>
           </a:p>
           <a:p>
@@ -37838,7 +37903,7 @@
                 </a:solidFill>
                 <a:cs typeface="Arial" charset="0"/>
               </a:rPr>
-              <a:t>ZTP - Zero Touch Provisioning</a:t>
+              <a:t>CAF - Cisco Application Hosting Framework</a:t>
             </a:r>
           </a:p>
           <a:p>
@@ -37854,12 +37919,15 @@
               </a:spcAft>
               <a:buNone/>
             </a:pPr>
-            <a:endParaRPr altLang="en-US" sz="1600" dirty="0">
-              <a:solidFill>
-                <a:schemeClr val="tx2"/>
-              </a:solidFill>
-              <a:cs typeface="Arial" charset="0"/>
-            </a:endParaRPr>
+            <a:r>
+              <a:rPr lang="en-US" altLang="en-US" sz="1600" dirty="0">
+                <a:solidFill>
+                  <a:schemeClr val="tx2"/>
+                </a:solidFill>
+                <a:cs typeface="Arial" charset="0"/>
+              </a:rPr>
+              <a:t>ZTP - Zero Touch Provisioning</a:t>
+            </a:r>
           </a:p>
         </p:txBody>
       </p:sp>

</xml_diff>